<commit_message>
IMPLEMENTED: mixing_tank ATMega328P Controller
</commit_message>
<xml_diff>
--- a/controllers/design/mixing_tank/fsa.pptx
+++ b/controllers/design/mixing_tank/fsa.pptx
@@ -3574,7 +3574,7 @@
           <a:bodyPr rtlCol="0" anchor="ctr"/>
           <a:p>
             <a:pPr algn="ctr"/>
-            <a:endParaRPr lang="en-US"/>
+            <a:endParaRPr lang="en-US" sz="1400"/>
           </a:p>
         </p:txBody>
       </p:sp>
@@ -3601,14 +3601,14 @@
           <a:p>
             <a:pPr algn="ctr"/>
             <a:r>
-              <a:rPr lang="" altLang="en-US" sz="2800"/>
+              <a:rPr lang="en-US" altLang="en-US" sz="2800"/>
               <a:t>Z</a:t>
             </a:r>
             <a:r>
-              <a:rPr lang="" altLang="en-US" sz="2800" baseline="-25000"/>
+              <a:rPr lang="en-US" altLang="en-US" sz="2800" baseline="-25000"/>
               <a:t>0</a:t>
             </a:r>
-            <a:endParaRPr lang="" altLang="en-US" sz="2800" baseline="-25000"/>
+            <a:endParaRPr lang="en-US" altLang="en-US" sz="2800" baseline="-25000"/>
           </a:p>
         </p:txBody>
       </p:sp>
@@ -3657,7 +3657,7 @@
           <a:bodyPr rtlCol="0" anchor="ctr"/>
           <a:p>
             <a:pPr algn="ctr"/>
-            <a:endParaRPr lang="en-US"/>
+            <a:endParaRPr lang="en-US" sz="1400"/>
           </a:p>
         </p:txBody>
       </p:sp>
@@ -3688,10 +3688,10 @@
               <a:t>Z</a:t>
             </a:r>
             <a:r>
-              <a:rPr lang="" altLang="en-US" sz="2800" baseline="-25000"/>
+              <a:rPr lang="en-US" altLang="en-US" sz="2800" baseline="-25000"/>
               <a:t>4</a:t>
             </a:r>
-            <a:endParaRPr lang="" altLang="en-US" sz="2800" baseline="-25000"/>
+            <a:endParaRPr lang="en-US" altLang="en-US" sz="2800" baseline="-25000"/>
           </a:p>
         </p:txBody>
       </p:sp>
@@ -3740,7 +3740,7 @@
           <a:bodyPr rtlCol="0" anchor="ctr"/>
           <a:p>
             <a:pPr algn="ctr"/>
-            <a:endParaRPr lang="en-US"/>
+            <a:endParaRPr lang="en-US" sz="1400"/>
           </a:p>
         </p:txBody>
       </p:sp>
@@ -3771,10 +3771,10 @@
               <a:t>Z</a:t>
             </a:r>
             <a:r>
-              <a:rPr lang="" altLang="en-US" sz="2800" baseline="-25000"/>
+              <a:rPr lang="en-US" altLang="en-US" sz="2800" baseline="-25000"/>
               <a:t>2</a:t>
             </a:r>
-            <a:endParaRPr lang="" altLang="en-US" sz="2800" baseline="-25000"/>
+            <a:endParaRPr lang="en-US" altLang="en-US" sz="2800" baseline="-25000"/>
           </a:p>
         </p:txBody>
       </p:sp>
@@ -3854,10 +3854,10 @@
               <a:t>Z</a:t>
             </a:r>
             <a:r>
-              <a:rPr lang="" altLang="en-US" sz="2800" baseline="-25000"/>
+              <a:rPr lang="en-US" altLang="en-US" sz="2800" baseline="-25000"/>
               <a:t>3</a:t>
             </a:r>
-            <a:endParaRPr lang="" altLang="en-US" sz="2800" baseline="-25000"/>
+            <a:endParaRPr lang="en-US" altLang="en-US" sz="2800" baseline="-25000"/>
           </a:p>
         </p:txBody>
       </p:sp>
@@ -3906,7 +3906,7 @@
           <a:bodyPr rtlCol="0" anchor="ctr"/>
           <a:p>
             <a:pPr algn="ctr"/>
-            <a:endParaRPr lang="en-US"/>
+            <a:endParaRPr lang="en-US" sz="1400"/>
           </a:p>
         </p:txBody>
       </p:sp>
@@ -3937,10 +3937,10 @@
               <a:t>Z</a:t>
             </a:r>
             <a:r>
-              <a:rPr lang="" altLang="en-US" sz="2800" baseline="-25000"/>
+              <a:rPr lang="en-US" altLang="en-US" sz="2800" baseline="-25000"/>
               <a:t>1</a:t>
             </a:r>
-            <a:endParaRPr lang="" altLang="en-US" sz="2800" baseline="-25000"/>
+            <a:endParaRPr lang="en-US" altLang="en-US" sz="2800" baseline="-25000"/>
           </a:p>
         </p:txBody>
       </p:sp>
@@ -4380,8 +4380,8 @@
             </p:nvSpPr>
             <p:spPr>
               <a:xfrm rot="1320000">
-                <a:off x="1377315" y="4665980"/>
-                <a:ext cx="2078355" cy="368300"/>
+                <a:off x="1358900" y="4761230"/>
+                <a:ext cx="2587625" cy="306705"/>
               </a:xfrm>
               <a:prstGeom prst="rect">
                 <a:avLst/>
@@ -4395,7 +4395,7 @@
               <a:p>
                 <a:pPr algn="ctr"/>
                 <a:r>
-                  <a:rPr lang="" altLang="en-US">
+                  <a:rPr lang="en-US" altLang="en-US" sz="1400">
                     <a:latin typeface="DejaVu Math TeX Gyre" panose="02000503000000000000" charset="0"/>
                     <a:cs typeface="DejaVu Math TeX Gyre" panose="02000503000000000000" charset="0"/>
                   </a:rPr>
@@ -4404,7 +4404,34 @@
                 <a14:m>
                   <m:oMath xmlns:m="http://schemas.openxmlformats.org/officeDocument/2006/math">
                     <m:r>
-                      <a:rPr lang="en-US" altLang="" i="1">
+                      <a:rPr lang="en-US" altLang="en-US" sz="1400">
+                        <a:latin typeface="DejaVu Math TeX Gyre" panose="02000503000000000000" charset="0"/>
+                        <a:ea typeface="MS Mincho" charset="0"/>
+                        <a:cs typeface="DejaVu Math TeX Gyre" panose="02000503000000000000" charset="0"/>
+                      </a:rPr>
+                      <m:t>∩¬</m:t>
+                    </m:r>
+                    <m:r>
+                      <m:rPr>
+                        <m:sty m:val="p"/>
+                      </m:rPr>
+                      <a:rPr lang="en-US" altLang="en-US" sz="1400">
+                        <a:latin typeface="DejaVu Math TeX Gyre" panose="02000503000000000000" charset="0"/>
+                        <a:ea typeface="MS Mincho" charset="0"/>
+                        <a:cs typeface="DejaVu Math TeX Gyre" panose="02000503000000000000" charset="0"/>
+                      </a:rPr>
+                      <m:t>B</m:t>
+                    </m:r>
+                    <m:r>
+                      <a:rPr lang="en-US" altLang="en-US" sz="1400">
+                        <a:latin typeface="DejaVu Math TeX Gyre" panose="02000503000000000000" charset="0"/>
+                        <a:ea typeface="MS Mincho" charset="0"/>
+                        <a:cs typeface="DejaVu Math TeX Gyre" panose="02000503000000000000" charset="0"/>
+                      </a:rPr>
+                      <m:t>2</m:t>
+                    </m:r>
+                    <m:r>
+                      <a:rPr lang="en-US" altLang="en-US" sz="1400">
                         <a:latin typeface="DejaVu Math TeX Gyre" panose="02000503000000000000" charset="0"/>
                         <a:ea typeface="MS Mincho" charset="0"/>
                         <a:cs typeface="DejaVu Math TeX Gyre" panose="02000503000000000000" charset="0"/>
@@ -4414,13 +4441,13 @@
                   </m:oMath>
                 </a14:m>
                 <a:r>
-                  <a:rPr lang="" altLang="en-US">
+                  <a:rPr lang="en-US" altLang="en-US" sz="1400">
                     <a:latin typeface="DejaVu Math TeX Gyre" panose="02000503000000000000" charset="0"/>
                     <a:cs typeface="DejaVu Math TeX Gyre" panose="02000503000000000000" charset="0"/>
                   </a:rPr>
                   <a:t> LS_2</a:t>
                 </a:r>
-                <a:endParaRPr lang="" altLang="en-US">
+                <a:endParaRPr lang="en-US" altLang="en-US" sz="1400">
                   <a:latin typeface="DejaVu Math TeX Gyre" panose="02000503000000000000" charset="0"/>
                   <a:cs typeface="DejaVu Math TeX Gyre" panose="02000503000000000000" charset="0"/>
                 </a:endParaRPr>
@@ -4439,8 +4466,8 @@
             </p:nvSpPr>
             <p:spPr>
               <a:xfrm rot="1320000">
-                <a:off x="1377315" y="4665980"/>
-                <a:ext cx="2078355" cy="368300"/>
+                <a:off x="1358900" y="4761230"/>
+                <a:ext cx="2587625" cy="306705"/>
               </a:xfrm>
               <a:prstGeom prst="rect">
                 <a:avLst/>
@@ -4448,7 +4475,7 @@
               <a:blipFill rotWithShape="1">
                 <a:blip r:embed="rId1"/>
                 <a:stretch>
-                  <a:fillRect l="306" t="-102069" r="336" b="-101897"/>
+                  <a:fillRect l="1399" t="-154451" r="1423" b="-154244"/>
                 </a:stretch>
               </a:blipFill>
             </p:spPr>
@@ -4477,8 +4504,8 @@
             </p:nvSpPr>
             <p:spPr>
               <a:xfrm rot="20340000">
-                <a:off x="2707005" y="1379220"/>
-                <a:ext cx="2078355" cy="386080"/>
+                <a:off x="2404745" y="1435100"/>
+                <a:ext cx="2390775" cy="306705"/>
               </a:xfrm>
               <a:prstGeom prst="rect">
                 <a:avLst/>
@@ -4492,75 +4519,79 @@
               <a:p>
                 <a:pPr algn="ctr"/>
                 <a:r>
-                  <a:rPr lang="en-US" altLang="en-US">
+                  <a:rPr lang="en-US" altLang="en-US" sz="1400">
                     <a:latin typeface="DejaVu Math TeX Gyre" panose="02000503000000000000" charset="0"/>
                     <a:cs typeface="DejaVu Math TeX Gyre" panose="02000503000000000000" charset="0"/>
                   </a:rPr>
-                  <a:t>B1 </a:t>
+                  <a:t>B1</a:t>
                 </a:r>
                 <a14:m>
                   <m:oMath xmlns:m="http://schemas.openxmlformats.org/officeDocument/2006/math">
                     <m:r>
-                      <a:rPr lang="en-US" altLang="en-US" i="1">
+                      <a:rPr lang="en-US" altLang="en-US" sz="1400">
                         <a:latin typeface="DejaVu Math TeX Gyre" panose="02000503000000000000" charset="0"/>
                         <a:ea typeface="MS Mincho" charset="0"/>
                         <a:cs typeface="DejaVu Math TeX Gyre" panose="02000503000000000000" charset="0"/>
                       </a:rPr>
-                      <m:t>∩</m:t>
+                      <m:t>∩¬</m:t>
+                    </m:r>
+                    <m:r>
+                      <m:rPr>
+                        <m:sty m:val="p"/>
+                      </m:rPr>
+                      <a:rPr lang="en-US" altLang="en-US" sz="1400">
+                        <a:latin typeface="DejaVu Math TeX Gyre" panose="02000503000000000000" charset="0"/>
+                        <a:ea typeface="MS Mincho" charset="0"/>
+                        <a:cs typeface="DejaVu Math TeX Gyre" panose="02000503000000000000" charset="0"/>
+                      </a:rPr>
+                      <m:t>B</m:t>
+                    </m:r>
+                    <m:r>
+                      <a:rPr lang="en-US" altLang="en-US" sz="1400">
+                        <a:latin typeface="DejaVu Math TeX Gyre" panose="02000503000000000000" charset="0"/>
+                        <a:ea typeface="MS Mincho" charset="0"/>
+                        <a:cs typeface="DejaVu Math TeX Gyre" panose="02000503000000000000" charset="0"/>
+                      </a:rPr>
+                      <m:t>2</m:t>
+                    </m:r>
+                    <m:r>
+                      <a:rPr lang="en-US" altLang="en-US" sz="1400">
+                        <a:latin typeface="DejaVu Math TeX Gyre" panose="02000503000000000000" charset="0"/>
+                        <a:ea typeface="MS Mincho" charset="0"/>
+                        <a:cs typeface="DejaVu Math TeX Gyre" panose="02000503000000000000" charset="0"/>
+                      </a:rPr>
+                      <m:t>∩¬</m:t>
+                    </m:r>
+                    <m:r>
+                      <m:rPr>
+                        <m:sty m:val="p"/>
+                      </m:rPr>
+                      <a:rPr lang="en-US" altLang="en-US" sz="1400">
+                        <a:latin typeface="DejaVu Math TeX Gyre" panose="02000503000000000000" charset="0"/>
+                        <a:ea typeface="MS Mincho" charset="0"/>
+                        <a:cs typeface="DejaVu Math TeX Gyre" panose="02000503000000000000" charset="0"/>
+                      </a:rPr>
+                      <m:t>LS</m:t>
+                    </m:r>
+                    <m:r>
+                      <a:rPr lang="en-US" altLang="en-US" sz="1400">
+                        <a:latin typeface="DejaVu Math TeX Gyre" panose="02000503000000000000" charset="0"/>
+                        <a:ea typeface="MS Mincho" charset="0"/>
+                        <a:cs typeface="DejaVu Math TeX Gyre" panose="02000503000000000000" charset="0"/>
+                      </a:rPr>
+                      <m:t>_</m:t>
+                    </m:r>
+                    <m:r>
+                      <a:rPr lang="en-US" altLang="en-US" sz="1400">
+                        <a:latin typeface="DejaVu Math TeX Gyre" panose="02000503000000000000" charset="0"/>
+                        <a:ea typeface="MS Mincho" charset="0"/>
+                        <a:cs typeface="DejaVu Math TeX Gyre" panose="02000503000000000000" charset="0"/>
+                      </a:rPr>
+                      <m:t>2</m:t>
                     </m:r>
                   </m:oMath>
                 </a14:m>
-                <a:r>
-                  <a:rPr lang="en-US" altLang="en-US">
-                    <a:latin typeface="DejaVu Math TeX Gyre" panose="02000503000000000000" charset="0"/>
-                    <a:cs typeface="DejaVu Math TeX Gyre" panose="02000503000000000000" charset="0"/>
-                  </a:rPr>
-                  <a:t> </a:t>
-                </a:r>
-                <a14:m>
-                  <m:oMath xmlns:m="http://schemas.openxmlformats.org/officeDocument/2006/math">
-                    <m:acc>
-                      <m:accPr>
-                        <m:chr m:val="̅"/>
-                        <m:ctrlPr>
-                          <a:rPr lang="en-US" altLang="en-US" i="1">
-                            <a:latin typeface="DejaVu Math TeX Gyre" panose="02000503000000000000" charset="0"/>
-                            <a:cs typeface="DejaVu Math TeX Gyre" panose="02000503000000000000" charset="0"/>
-                          </a:rPr>
-                        </m:ctrlPr>
-                      </m:accPr>
-                      <m:e>
-                        <m:r>
-                          <m:rPr>
-                            <m:sty m:val="p"/>
-                          </m:rPr>
-                          <a:rPr lang="en-US" altLang="en-US">
-                            <a:latin typeface="DejaVu Math TeX Gyre" panose="02000503000000000000" charset="0"/>
-                            <a:cs typeface="DejaVu Math TeX Gyre" panose="02000503000000000000" charset="0"/>
-                          </a:rPr>
-                          <m:t>LS</m:t>
-                        </m:r>
-                        <m:r>
-                          <a:rPr lang="en-US" altLang="en-US">
-                            <a:latin typeface="DejaVu Math TeX Gyre" panose="02000503000000000000" charset="0"/>
-                            <a:ea typeface="MS Mincho" charset="0"/>
-                            <a:cs typeface="DejaVu Math TeX Gyre" panose="02000503000000000000" charset="0"/>
-                          </a:rPr>
-                          <m:t>_</m:t>
-                        </m:r>
-                        <m:r>
-                          <a:rPr lang="en-US" altLang="en-US">
-                            <a:latin typeface="DejaVu Math TeX Gyre" panose="02000503000000000000" charset="0"/>
-                            <a:ea typeface="MS Mincho" charset="0"/>
-                            <a:cs typeface="DejaVu Math TeX Gyre" panose="02000503000000000000" charset="0"/>
-                          </a:rPr>
-                          <m:t>2</m:t>
-                        </m:r>
-                      </m:e>
-                    </m:acc>
-                  </m:oMath>
-                </a14:m>
-                <a:endParaRPr lang="en-US" altLang="en-US">
+                <a:endParaRPr lang="en-US" altLang="en-US" sz="1400">
                   <a:latin typeface="DejaVu Math TeX Gyre" panose="02000503000000000000" charset="0"/>
                   <a:cs typeface="DejaVu Math TeX Gyre" panose="02000503000000000000" charset="0"/>
                 </a:endParaRPr>
@@ -4579,8 +4610,8 @@
             </p:nvSpPr>
             <p:spPr>
               <a:xfrm rot="20340000">
-                <a:off x="2707005" y="1379220"/>
-                <a:ext cx="2078355" cy="386080"/>
+                <a:off x="2404745" y="1435100"/>
+                <a:ext cx="2390775" cy="306705"/>
               </a:xfrm>
               <a:prstGeom prst="rect">
                 <a:avLst/>
@@ -4588,7 +4619,7 @@
               <a:blipFill rotWithShape="1">
                 <a:blip r:embed="rId2"/>
                 <a:stretch>
-                  <a:fillRect l="-31" t="-93257" b="-93092"/>
+                  <a:fillRect l="1009" t="-136439" r="1036" b="-136232"/>
                 </a:stretch>
               </a:blipFill>
             </p:spPr>
@@ -4617,8 +4648,8 @@
             </p:nvSpPr>
             <p:spPr>
               <a:xfrm>
-                <a:off x="3227070" y="2343150"/>
-                <a:ext cx="2078355" cy="368300"/>
+                <a:off x="2418080" y="2343150"/>
+                <a:ext cx="3182620" cy="306705"/>
               </a:xfrm>
               <a:prstGeom prst="rect">
                 <a:avLst/>
@@ -4632,16 +4663,43 @@
               <a:p>
                 <a:pPr algn="ctr"/>
                 <a:r>
-                  <a:rPr lang="en-US" altLang="en-US">
+                  <a:rPr lang="en-US" altLang="en-US" sz="1400">
                     <a:latin typeface="DejaVu Math TeX Gyre" panose="02000503000000000000" charset="0"/>
                     <a:cs typeface="DejaVu Math TeX Gyre" panose="02000503000000000000" charset="0"/>
                   </a:rPr>
-                  <a:t>B1 </a:t>
+                  <a:t>B1</a:t>
                 </a:r>
                 <a14:m>
                   <m:oMath xmlns:m="http://schemas.openxmlformats.org/officeDocument/2006/math">
                     <m:r>
-                      <a:rPr lang="en-US" altLang="en-US" i="1">
+                      <a:rPr lang="en-US" altLang="en-US" sz="1400">
+                        <a:latin typeface="DejaVu Math TeX Gyre" panose="02000503000000000000" charset="0"/>
+                        <a:ea typeface="MS Mincho" charset="0"/>
+                        <a:cs typeface="DejaVu Math TeX Gyre" panose="02000503000000000000" charset="0"/>
+                      </a:rPr>
+                      <m:t>∩¬</m:t>
+                    </m:r>
+                    <m:r>
+                      <m:rPr>
+                        <m:sty m:val="p"/>
+                      </m:rPr>
+                      <a:rPr lang="en-US" altLang="en-US" sz="1400">
+                        <a:latin typeface="DejaVu Math TeX Gyre" panose="02000503000000000000" charset="0"/>
+                        <a:ea typeface="MS Mincho" charset="0"/>
+                        <a:cs typeface="DejaVu Math TeX Gyre" panose="02000503000000000000" charset="0"/>
+                      </a:rPr>
+                      <m:t>B</m:t>
+                    </m:r>
+                    <m:r>
+                      <a:rPr lang="en-US" altLang="en-US" sz="1400">
+                        <a:latin typeface="DejaVu Math TeX Gyre" panose="02000503000000000000" charset="0"/>
+                        <a:ea typeface="MS Mincho" charset="0"/>
+                        <a:cs typeface="DejaVu Math TeX Gyre" panose="02000503000000000000" charset="0"/>
+                      </a:rPr>
+                      <m:t>2</m:t>
+                    </m:r>
+                    <m:r>
+                      <a:rPr lang="en-US" altLang="en-US" sz="1400">
                         <a:latin typeface="DejaVu Math TeX Gyre" panose="02000503000000000000" charset="0"/>
                         <a:ea typeface="MS Mincho" charset="0"/>
                         <a:cs typeface="DejaVu Math TeX Gyre" panose="02000503000000000000" charset="0"/>
@@ -4651,34 +4709,27 @@
                   </m:oMath>
                 </a14:m>
                 <a:r>
-                  <a:rPr lang="en-US" altLang="en-US">
+                  <a:rPr lang="en-US" altLang="en-US" sz="1400">
                     <a:latin typeface="DejaVu Math TeX Gyre" panose="02000503000000000000" charset="0"/>
                     <a:cs typeface="DejaVu Math TeX Gyre" panose="02000503000000000000" charset="0"/>
                   </a:rPr>
-                  <a:t> </a:t>
+                  <a:t> (</a:t>
                 </a:r>
                 <a:r>
-                  <a:rPr lang="" altLang="en-US">
-                    <a:latin typeface="DejaVu Math TeX Gyre" panose="02000503000000000000" charset="0"/>
-                    <a:cs typeface="DejaVu Math TeX Gyre" panose="02000503000000000000" charset="0"/>
-                  </a:rPr>
-                  <a:t>(</a:t>
-                </a:r>
-                <a:r>
-                  <a:rPr lang="">
+                  <a:rPr lang="en-US" sz="1400">
                     <a:latin typeface="DejaVu Math TeX Gyre" panose="02000503000000000000" charset="0"/>
                     <a:cs typeface="DejaVu Math TeX Gyre" panose="02000503000000000000" charset="0"/>
                   </a:rPr>
                   <a:t>sus==1</a:t>
                 </a:r>
                 <a:r>
-                  <a:rPr lang="" altLang="en-US">
+                  <a:rPr lang="en-US" altLang="en-US" sz="1400">
                     <a:latin typeface="DejaVu Math TeX Gyre" panose="02000503000000000000" charset="0"/>
                     <a:cs typeface="DejaVu Math TeX Gyre" panose="02000503000000000000" charset="0"/>
                   </a:rPr>
                   <a:t>)</a:t>
                 </a:r>
-                <a:endParaRPr lang="" altLang="en-US">
+                <a:endParaRPr lang="en-US" altLang="en-US" sz="1400">
                   <a:latin typeface="DejaVu Math TeX Gyre" panose="02000503000000000000" charset="0"/>
                   <a:cs typeface="DejaVu Math TeX Gyre" panose="02000503000000000000" charset="0"/>
                 </a:endParaRPr>
@@ -4697,8 +4748,8 @@
             </p:nvSpPr>
             <p:spPr>
               <a:xfrm>
-                <a:off x="3227070" y="2343150"/>
-                <a:ext cx="2078355" cy="368300"/>
+                <a:off x="2418080" y="2343150"/>
+                <a:ext cx="3182620" cy="306705"/>
               </a:xfrm>
               <a:prstGeom prst="rect">
                 <a:avLst/>
@@ -4734,7 +4785,7 @@
         <p:spPr>
           <a:xfrm>
             <a:off x="3148330" y="2968625"/>
-            <a:ext cx="2078355" cy="368300"/>
+            <a:ext cx="2078355" cy="306705"/>
           </a:xfrm>
           <a:prstGeom prst="rect">
             <a:avLst/>
@@ -4748,20 +4799,13 @@
           <a:p>
             <a:pPr algn="ctr"/>
             <a:r>
-              <a:rPr lang="en-US" altLang="en-US">
+              <a:rPr lang="en-US" altLang="en-US" sz="1400">
                 <a:latin typeface="DejaVu Math TeX Gyre" panose="02000503000000000000" charset="0"/>
                 <a:cs typeface="DejaVu Math TeX Gyre" panose="02000503000000000000" charset="0"/>
               </a:rPr>
-              <a:t>B</a:t>
-            </a:r>
-            <a:r>
-              <a:rPr lang="" altLang="en-US">
-                <a:latin typeface="DejaVu Math TeX Gyre" panose="02000503000000000000" charset="0"/>
-                <a:cs typeface="DejaVu Math TeX Gyre" panose="02000503000000000000" charset="0"/>
-              </a:rPr>
-              <a:t>2</a:t>
-            </a:r>
-            <a:endParaRPr lang="" altLang="en-US">
+              <a:t>B2</a:t>
+            </a:r>
+            <a:endParaRPr lang="en-US" altLang="en-US" sz="1400">
               <a:latin typeface="DejaVu Math TeX Gyre" panose="02000503000000000000" charset="0"/>
               <a:cs typeface="DejaVu Math TeX Gyre" panose="02000503000000000000" charset="0"/>
             </a:endParaRPr>
@@ -4778,8 +4822,8 @@
             </p:nvSpPr>
             <p:spPr>
               <a:xfrm>
-                <a:off x="6931025" y="2364740"/>
-                <a:ext cx="2078355" cy="368300"/>
+                <a:off x="6661150" y="2398395"/>
+                <a:ext cx="2548255" cy="306705"/>
               </a:xfrm>
               <a:prstGeom prst="rect">
                 <a:avLst/>
@@ -4793,16 +4837,54 @@
               <a:p>
                 <a:pPr algn="ctr"/>
                 <a:r>
-                  <a:rPr lang="en-US" altLang="en-US">
+                  <a:rPr lang="en-US" altLang="en-US" sz="1400">
                     <a:latin typeface="DejaVu Math TeX Gyre" panose="02000503000000000000" charset="0"/>
                     <a:cs typeface="DejaVu Math TeX Gyre" panose="02000503000000000000" charset="0"/>
                   </a:rPr>
-                  <a:t>B1 </a:t>
+                  <a:t>B1</a:t>
                 </a:r>
                 <a14:m>
                   <m:oMath xmlns:m="http://schemas.openxmlformats.org/officeDocument/2006/math">
                     <m:r>
-                      <a:rPr lang="en-US" altLang="en-US" i="1">
+                      <a:rPr lang="en-US" altLang="en-US" sz="1400">
+                        <a:latin typeface="DejaVu Math TeX Gyre" panose="02000503000000000000" charset="0"/>
+                        <a:ea typeface="MS Mincho" charset="0"/>
+                        <a:cs typeface="DejaVu Math TeX Gyre" panose="02000503000000000000" charset="0"/>
+                      </a:rPr>
+                      <m:t>∩¬</m:t>
+                    </m:r>
+                    <m:r>
+                      <m:rPr>
+                        <m:sty m:val="p"/>
+                      </m:rPr>
+                      <a:rPr lang="en-US" altLang="en-US" sz="1400">
+                        <a:latin typeface="DejaVu Math TeX Gyre" panose="02000503000000000000" charset="0"/>
+                        <a:ea typeface="MS Mincho" charset="0"/>
+                        <a:cs typeface="DejaVu Math TeX Gyre" panose="02000503000000000000" charset="0"/>
+                      </a:rPr>
+                      <m:t>B</m:t>
+                    </m:r>
+                    <m:r>
+                      <a:rPr lang="en-US" altLang="en-US" sz="1400">
+                        <a:latin typeface="DejaVu Math TeX Gyre" panose="02000503000000000000" charset="0"/>
+                        <a:ea typeface="MS Mincho" charset="0"/>
+                        <a:cs typeface="DejaVu Math TeX Gyre" panose="02000503000000000000" charset="0"/>
+                      </a:rPr>
+                      <m:t>2</m:t>
+                    </m:r>
+                  </m:oMath>
+                </a14:m>
+                <a:r>
+                  <a:rPr lang="en-US" altLang="en-US" sz="1400">
+                    <a:latin typeface="DejaVu Math TeX Gyre" panose="02000503000000000000" charset="0"/>
+                    <a:cs typeface="DejaVu Math TeX Gyre" panose="02000503000000000000" charset="0"/>
+                  </a:rPr>
+                  <a:t> </a:t>
+                </a:r>
+                <a14:m>
+                  <m:oMath xmlns:m="http://schemas.openxmlformats.org/officeDocument/2006/math">
+                    <m:r>
+                      <a:rPr lang="en-US" altLang="en-US" sz="1400">
                         <a:latin typeface="DejaVu Math TeX Gyre" panose="02000503000000000000" charset="0"/>
                         <a:ea typeface="MS Mincho" charset="0"/>
                         <a:cs typeface="DejaVu Math TeX Gyre" panose="02000503000000000000" charset="0"/>
@@ -4812,34 +4894,27 @@
                   </m:oMath>
                 </a14:m>
                 <a:r>
-                  <a:rPr lang="en-US" altLang="en-US">
+                  <a:rPr lang="en-US" altLang="en-US" sz="1400">
                     <a:latin typeface="DejaVu Math TeX Gyre" panose="02000503000000000000" charset="0"/>
                     <a:cs typeface="DejaVu Math TeX Gyre" panose="02000503000000000000" charset="0"/>
                   </a:rPr>
                   <a:t> (</a:t>
                 </a:r>
                 <a:r>
-                  <a:rPr lang="en-US">
+                  <a:rPr lang="en-US" sz="1400">
                     <a:latin typeface="DejaVu Math TeX Gyre" panose="02000503000000000000" charset="0"/>
                     <a:cs typeface="DejaVu Math TeX Gyre" panose="02000503000000000000" charset="0"/>
                   </a:rPr>
                   <a:t>sus==</a:t>
                 </a:r>
                 <a:r>
-                  <a:rPr lang="" altLang="en-US">
+                  <a:rPr lang="en-US" altLang="en-US" sz="1400">
                     <a:latin typeface="DejaVu Math TeX Gyre" panose="02000503000000000000" charset="0"/>
                     <a:cs typeface="DejaVu Math TeX Gyre" panose="02000503000000000000" charset="0"/>
                   </a:rPr>
-                  <a:t>3</a:t>
+                  <a:t>3)</a:t>
                 </a:r>
-                <a:r>
-                  <a:rPr lang="en-US" altLang="en-US">
-                    <a:latin typeface="DejaVu Math TeX Gyre" panose="02000503000000000000" charset="0"/>
-                    <a:cs typeface="DejaVu Math TeX Gyre" panose="02000503000000000000" charset="0"/>
-                  </a:rPr>
-                  <a:t>)</a:t>
-                </a:r>
-                <a:endParaRPr lang="en-US" altLang="en-US">
+                <a:endParaRPr lang="en-US" altLang="en-US" sz="1400">
                   <a:latin typeface="DejaVu Math TeX Gyre" panose="02000503000000000000" charset="0"/>
                   <a:cs typeface="DejaVu Math TeX Gyre" panose="02000503000000000000" charset="0"/>
                 </a:endParaRPr>
@@ -4858,8 +4933,8 @@
             </p:nvSpPr>
             <p:spPr>
               <a:xfrm>
-                <a:off x="6931025" y="2364740"/>
-                <a:ext cx="2078355" cy="368300"/>
+                <a:off x="6661150" y="2398395"/>
+                <a:ext cx="2548255" cy="306705"/>
               </a:xfrm>
               <a:prstGeom prst="rect">
                 <a:avLst/>
@@ -4895,7 +4970,7 @@
         <p:spPr>
           <a:xfrm>
             <a:off x="6931025" y="2975610"/>
-            <a:ext cx="2078355" cy="368300"/>
+            <a:ext cx="2078355" cy="306705"/>
           </a:xfrm>
           <a:prstGeom prst="rect">
             <a:avLst/>
@@ -4909,20 +4984,13 @@
           <a:p>
             <a:pPr algn="ctr"/>
             <a:r>
-              <a:rPr lang="en-US" altLang="en-US">
+              <a:rPr lang="en-US" altLang="en-US" sz="1400">
                 <a:latin typeface="DejaVu Math TeX Gyre" panose="02000503000000000000" charset="0"/>
                 <a:cs typeface="DejaVu Math TeX Gyre" panose="02000503000000000000" charset="0"/>
               </a:rPr>
-              <a:t>B</a:t>
-            </a:r>
-            <a:r>
-              <a:rPr lang="" altLang="en-US">
-                <a:latin typeface="DejaVu Math TeX Gyre" panose="02000503000000000000" charset="0"/>
-                <a:cs typeface="DejaVu Math TeX Gyre" panose="02000503000000000000" charset="0"/>
-              </a:rPr>
-              <a:t>2</a:t>
-            </a:r>
-            <a:endParaRPr lang="" altLang="en-US">
+              <a:t>B2</a:t>
+            </a:r>
+            <a:endParaRPr lang="en-US" altLang="en-US" sz="1400">
               <a:latin typeface="DejaVu Math TeX Gyre" panose="02000503000000000000" charset="0"/>
               <a:cs typeface="DejaVu Math TeX Gyre" panose="02000503000000000000" charset="0"/>
             </a:endParaRPr>
@@ -4939,8 +5007,8 @@
             </p:nvSpPr>
             <p:spPr>
               <a:xfrm rot="16200000">
-                <a:off x="4628515" y="4186555"/>
-                <a:ext cx="2078355" cy="368300"/>
+                <a:off x="4588510" y="4213225"/>
+                <a:ext cx="2211705" cy="306705"/>
               </a:xfrm>
               <a:prstGeom prst="rect">
                 <a:avLst/>
@@ -4954,7 +5022,7 @@
               <a:p>
                 <a:pPr algn="ctr"/>
                 <a:r>
-                  <a:rPr lang="en-US" altLang="en-US">
+                  <a:rPr lang="en-US" altLang="en-US" sz="1400">
                     <a:latin typeface="DejaVu Math TeX Gyre" panose="02000503000000000000" charset="0"/>
                     <a:cs typeface="DejaVu Math TeX Gyre" panose="02000503000000000000" charset="0"/>
                   </a:rPr>
@@ -4963,7 +5031,34 @@
                 <a14:m>
                   <m:oMath xmlns:m="http://schemas.openxmlformats.org/officeDocument/2006/math">
                     <m:r>
-                      <a:rPr lang="en-US" altLang="en-US" i="1">
+                      <a:rPr lang="en-US" altLang="en-US" sz="1400">
+                        <a:latin typeface="DejaVu Math TeX Gyre" panose="02000503000000000000" charset="0"/>
+                        <a:ea typeface="MS Mincho" charset="0"/>
+                        <a:cs typeface="DejaVu Math TeX Gyre" panose="02000503000000000000" charset="0"/>
+                      </a:rPr>
+                      <m:t>∩¬</m:t>
+                    </m:r>
+                    <m:r>
+                      <m:rPr>
+                        <m:sty m:val="p"/>
+                      </m:rPr>
+                      <a:rPr lang="en-US" altLang="en-US" sz="1400">
+                        <a:latin typeface="DejaVu Math TeX Gyre" panose="02000503000000000000" charset="0"/>
+                        <a:ea typeface="MS Mincho" charset="0"/>
+                        <a:cs typeface="DejaVu Math TeX Gyre" panose="02000503000000000000" charset="0"/>
+                      </a:rPr>
+                      <m:t>B</m:t>
+                    </m:r>
+                    <m:r>
+                      <a:rPr lang="en-US" altLang="en-US" sz="1400">
+                        <a:latin typeface="DejaVu Math TeX Gyre" panose="02000503000000000000" charset="0"/>
+                        <a:ea typeface="MS Mincho" charset="0"/>
+                        <a:cs typeface="DejaVu Math TeX Gyre" panose="02000503000000000000" charset="0"/>
+                      </a:rPr>
+                      <m:t>2</m:t>
+                    </m:r>
+                    <m:r>
+                      <a:rPr lang="en-US" altLang="en-US" sz="1400">
                         <a:latin typeface="DejaVu Math TeX Gyre" panose="02000503000000000000" charset="0"/>
                         <a:ea typeface="MS Mincho" charset="0"/>
                         <a:cs typeface="DejaVu Math TeX Gyre" panose="02000503000000000000" charset="0"/>
@@ -4973,34 +5068,27 @@
                   </m:oMath>
                 </a14:m>
                 <a:r>
-                  <a:rPr lang="en-US" altLang="en-US">
+                  <a:rPr lang="en-US" altLang="en-US" sz="1400">
                     <a:latin typeface="DejaVu Math TeX Gyre" panose="02000503000000000000" charset="0"/>
                     <a:cs typeface="DejaVu Math TeX Gyre" panose="02000503000000000000" charset="0"/>
                   </a:rPr>
-                  <a:t> (</a:t>
+                  <a:t>(</a:t>
                 </a:r>
                 <a:r>
-                  <a:rPr lang="en-US">
+                  <a:rPr lang="en-US" sz="1400">
                     <a:latin typeface="DejaVu Math TeX Gyre" panose="02000503000000000000" charset="0"/>
                     <a:cs typeface="DejaVu Math TeX Gyre" panose="02000503000000000000" charset="0"/>
                   </a:rPr>
                   <a:t>sus==</a:t>
                 </a:r>
                 <a:r>
-                  <a:rPr lang="" altLang="en-US">
+                  <a:rPr lang="en-US" altLang="en-US" sz="1400">
                     <a:latin typeface="DejaVu Math TeX Gyre" panose="02000503000000000000" charset="0"/>
                     <a:cs typeface="DejaVu Math TeX Gyre" panose="02000503000000000000" charset="0"/>
                   </a:rPr>
-                  <a:t>2</a:t>
+                  <a:t>2)</a:t>
                 </a:r>
-                <a:r>
-                  <a:rPr lang="en-US" altLang="en-US">
-                    <a:latin typeface="DejaVu Math TeX Gyre" panose="02000503000000000000" charset="0"/>
-                    <a:cs typeface="DejaVu Math TeX Gyre" panose="02000503000000000000" charset="0"/>
-                  </a:rPr>
-                  <a:t>)</a:t>
-                </a:r>
-                <a:endParaRPr lang="en-US" altLang="en-US">
+                <a:endParaRPr lang="en-US" altLang="en-US" sz="1400">
                   <a:latin typeface="DejaVu Math TeX Gyre" panose="02000503000000000000" charset="0"/>
                   <a:cs typeface="DejaVu Math TeX Gyre" panose="02000503000000000000" charset="0"/>
                 </a:endParaRPr>
@@ -5019,8 +5107,8 @@
             </p:nvSpPr>
             <p:spPr>
               <a:xfrm rot="16200000">
-                <a:off x="4628515" y="4186555"/>
-                <a:ext cx="2078355" cy="368300"/>
+                <a:off x="4588510" y="4213225"/>
+                <a:ext cx="2211705" cy="306705"/>
               </a:xfrm>
               <a:prstGeom prst="rect">
                 <a:avLst/>
@@ -5028,7 +5116,7 @@
               <a:blipFill rotWithShape="1">
                 <a:blip r:embed="rId5"/>
                 <a:stretch>
-                  <a:fillRect l="41124" t="-232241" r="41155" b="-232069"/>
+                  <a:fillRect l="43066" t="-310559" r="43066" b="-310559"/>
                 </a:stretch>
               </a:blipFill>
             </p:spPr>
@@ -5056,7 +5144,7 @@
         <p:spPr>
           <a:xfrm rot="16200000">
             <a:off x="5466080" y="4234815"/>
-            <a:ext cx="2078355" cy="368300"/>
+            <a:ext cx="2078355" cy="306705"/>
           </a:xfrm>
           <a:prstGeom prst="rect">
             <a:avLst/>
@@ -5070,92 +5158,13 @@
           <a:p>
             <a:pPr algn="ctr"/>
             <a:r>
-              <a:rPr lang="en-US" altLang="en-US">
+              <a:rPr lang="en-US" altLang="en-US" sz="1400">
                 <a:latin typeface="DejaVu Math TeX Gyre" panose="02000503000000000000" charset="0"/>
                 <a:cs typeface="DejaVu Math TeX Gyre" panose="02000503000000000000" charset="0"/>
               </a:rPr>
-              <a:t>B</a:t>
-            </a:r>
-            <a:r>
-              <a:rPr lang="" altLang="en-US">
-                <a:latin typeface="DejaVu Math TeX Gyre" panose="02000503000000000000" charset="0"/>
-                <a:cs typeface="DejaVu Math TeX Gyre" panose="02000503000000000000" charset="0"/>
-              </a:rPr>
-              <a:t>2</a:t>
-            </a:r>
-            <a:endParaRPr lang="" altLang="en-US">
-              <a:latin typeface="DejaVu Math TeX Gyre" panose="02000503000000000000" charset="0"/>
-              <a:cs typeface="DejaVu Math TeX Gyre" panose="02000503000000000000" charset="0"/>
-            </a:endParaRPr>
-          </a:p>
-        </p:txBody>
-      </p:sp>
-      <p:sp>
-        <p:nvSpPr>
-          <p:cNvPr id="45" name="Text Box 44"/>
-          <p:cNvSpPr txBox="1"/>
-          <p:nvPr/>
-        </p:nvSpPr>
-        <p:spPr>
-          <a:xfrm rot="1800000">
-            <a:off x="2753995" y="4080510"/>
-            <a:ext cx="2078355" cy="368300"/>
-          </a:xfrm>
-          <a:prstGeom prst="rect">
-            <a:avLst/>
-          </a:prstGeom>
-          <a:noFill/>
-        </p:spPr>
-        <p:txBody>
-          <a:bodyPr wrap="square" rtlCol="0">
-            <a:spAutoFit/>
-          </a:bodyPr>
-          <a:p>
-            <a:pPr algn="ctr"/>
-            <a:r>
-              <a:rPr lang="" altLang="en-US">
-                <a:latin typeface="DejaVu Math TeX Gyre" panose="02000503000000000000" charset="0"/>
-                <a:cs typeface="DejaVu Math TeX Gyre" panose="02000503000000000000" charset="0"/>
-              </a:rPr>
-              <a:t>LS_2</a:t>
-            </a:r>
-            <a:endParaRPr lang="en-US" altLang="en-US">
-              <a:latin typeface="DejaVu Math TeX Gyre" panose="02000503000000000000" charset="0"/>
-              <a:cs typeface="DejaVu Math TeX Gyre" panose="02000503000000000000" charset="0"/>
-            </a:endParaRPr>
-          </a:p>
-        </p:txBody>
-      </p:sp>
-      <p:sp>
-        <p:nvSpPr>
-          <p:cNvPr id="46" name="Text Box 45"/>
-          <p:cNvSpPr txBox="1"/>
-          <p:nvPr/>
-        </p:nvSpPr>
-        <p:spPr>
-          <a:xfrm rot="19560000">
-            <a:off x="7005320" y="4364355"/>
-            <a:ext cx="2078355" cy="368300"/>
-          </a:xfrm>
-          <a:prstGeom prst="rect">
-            <a:avLst/>
-          </a:prstGeom>
-          <a:noFill/>
-        </p:spPr>
-        <p:txBody>
-          <a:bodyPr wrap="square" rtlCol="0">
-            <a:spAutoFit/>
-          </a:bodyPr>
-          <a:p>
-            <a:pPr algn="ctr"/>
-            <a:r>
-              <a:rPr lang="" altLang="en-US">
-                <a:latin typeface="DejaVu Math TeX Gyre" panose="02000503000000000000" charset="0"/>
-                <a:cs typeface="DejaVu Math TeX Gyre" panose="02000503000000000000" charset="0"/>
-              </a:rPr>
-              <a:t>T_5</a:t>
-            </a:r>
-            <a:endParaRPr lang="" altLang="en-US">
+              <a:t>B2</a:t>
+            </a:r>
+            <a:endParaRPr lang="en-US" altLang="en-US" sz="1400">
               <a:latin typeface="DejaVu Math TeX Gyre" panose="02000503000000000000" charset="0"/>
               <a:cs typeface="DejaVu Math TeX Gyre" panose="02000503000000000000" charset="0"/>
             </a:endParaRPr>
@@ -5166,14 +5175,14 @@
         <mc:Choice xmlns:a14="http://schemas.microsoft.com/office/drawing/2010/main" Requires="a14">
           <p:sp>
             <p:nvSpPr>
-              <p:cNvPr id="47" name="Text Box 46"/>
+              <p:cNvPr id="45" name="Text Box 44"/>
               <p:cNvSpPr txBox="1"/>
               <p:nvPr/>
             </p:nvSpPr>
             <p:spPr>
-              <a:xfrm rot="1320000">
-                <a:off x="7556500" y="1523365"/>
-                <a:ext cx="2078355" cy="367030"/>
+              <a:xfrm rot="1800000">
+                <a:off x="2753995" y="4080510"/>
+                <a:ext cx="2078355" cy="306705"/>
               </a:xfrm>
               <a:prstGeom prst="rect">
                 <a:avLst/>
@@ -5186,53 +5195,260 @@
               </a:bodyPr>
               <a:p>
                 <a:pPr algn="ctr"/>
+                <a:r>
+                  <a:rPr lang="en-US" altLang="en-US" sz="1400">
+                    <a:latin typeface="DejaVu Math TeX Gyre" panose="02000503000000000000" charset="0"/>
+                    <a:cs typeface="DejaVu Math TeX Gyre" panose="02000503000000000000" charset="0"/>
+                  </a:rPr>
+                  <a:t>LS_2</a:t>
+                </a:r>
                 <a14:m>
-                  <m:oMathPara xmlns:m="http://schemas.openxmlformats.org/officeDocument/2006/math">
-                    <m:oMathParaPr>
-                      <m:jc m:val="centerGroup"/>
-                    </m:oMathParaPr>
-                    <m:oMath xmlns:m="http://schemas.openxmlformats.org/officeDocument/2006/math">
-                      <m:acc>
-                        <m:accPr>
-                          <m:chr m:val="̅"/>
-                          <m:ctrlPr>
-                            <a:rPr lang="en-US" altLang="en-US">
-                              <a:latin typeface="DejaVu Math TeX Gyre" panose="02000503000000000000" charset="0"/>
-                              <a:cs typeface="DejaVu Math TeX Gyre" panose="02000503000000000000" charset="0"/>
-                            </a:rPr>
-                          </m:ctrlPr>
-                        </m:accPr>
-                        <m:e>
-                          <m:r>
-                            <m:rPr>
-                              <m:sty m:val="p"/>
-                            </m:rPr>
-                            <a:rPr lang="en-US" altLang="en-US">
-                              <a:latin typeface="DejaVu Math TeX Gyre" panose="02000503000000000000" charset="0"/>
-                              <a:cs typeface="DejaVu Math TeX Gyre" panose="02000503000000000000" charset="0"/>
-                            </a:rPr>
-                            <m:t>LS</m:t>
-                          </m:r>
-                          <m:r>
-                            <a:rPr lang="en-US" altLang="en-US">
-                              <a:latin typeface="DejaVu Math TeX Gyre" panose="02000503000000000000" charset="0"/>
-                              <a:cs typeface="DejaVu Math TeX Gyre" panose="02000503000000000000" charset="0"/>
-                            </a:rPr>
-                            <m:t>_</m:t>
-                          </m:r>
-                          <m:r>
-                            <a:rPr lang="en-US" altLang="en-US">
-                              <a:latin typeface="DejaVu Math TeX Gyre" panose="02000503000000000000" charset="0"/>
-                              <a:cs typeface="DejaVu Math TeX Gyre" panose="02000503000000000000" charset="0"/>
-                            </a:rPr>
-                            <m:t>1</m:t>
-                          </m:r>
-                        </m:e>
-                      </m:acc>
-                    </m:oMath>
-                  </m:oMathPara>
+                  <m:oMath xmlns:m="http://schemas.openxmlformats.org/officeDocument/2006/math">
+                    <m:r>
+                      <a:rPr lang="en-US" altLang="en-US" sz="1400">
+                        <a:latin typeface="DejaVu Math TeX Gyre" panose="02000503000000000000" charset="0"/>
+                        <a:ea typeface="MS Mincho" charset="0"/>
+                        <a:cs typeface="DejaVu Math TeX Gyre" panose="02000503000000000000" charset="0"/>
+                      </a:rPr>
+                      <m:t>∩¬</m:t>
+                    </m:r>
+                    <m:r>
+                      <m:rPr>
+                        <m:sty m:val="p"/>
+                      </m:rPr>
+                      <a:rPr lang="en-US" altLang="en-US" sz="1400">
+                        <a:latin typeface="DejaVu Math TeX Gyre" panose="02000503000000000000" charset="0"/>
+                        <a:ea typeface="MS Mincho" charset="0"/>
+                        <a:cs typeface="DejaVu Math TeX Gyre" panose="02000503000000000000" charset="0"/>
+                      </a:rPr>
+                      <m:t>B</m:t>
+                    </m:r>
+                    <m:r>
+                      <a:rPr lang="en-US" altLang="en-US" sz="1400">
+                        <a:latin typeface="DejaVu Math TeX Gyre" panose="02000503000000000000" charset="0"/>
+                        <a:ea typeface="MS Mincho" charset="0"/>
+                        <a:cs typeface="DejaVu Math TeX Gyre" panose="02000503000000000000" charset="0"/>
+                      </a:rPr>
+                      <m:t>2</m:t>
+                    </m:r>
+                  </m:oMath>
                 </a14:m>
-                <a:endParaRPr lang="en-US" altLang="en-US">
+                <a:endParaRPr lang="en-US" altLang="en-US" sz="1400">
+                  <a:latin typeface="DejaVu Math TeX Gyre" panose="02000503000000000000" charset="0"/>
+                  <a:cs typeface="DejaVu Math TeX Gyre" panose="02000503000000000000" charset="0"/>
+                </a:endParaRPr>
+              </a:p>
+            </p:txBody>
+          </p:sp>
+        </mc:Choice>
+        <mc:Fallback>
+          <p:sp>
+            <p:nvSpPr>
+              <p:cNvPr id="45" name="Text Box 44"/>
+              <p:cNvSpPr txBox="1">
+                <a:spLocks noRot="1" noChangeAspect="1" noMove="1" noResize="1" noEditPoints="1" noAdjustHandles="1" noChangeArrowheads="1" noChangeShapeType="1" noTextEdit="1"/>
+              </p:cNvSpPr>
+              <p:nvPr/>
+            </p:nvSpPr>
+            <p:spPr>
+              <a:xfrm rot="1800000">
+                <a:off x="2753995" y="4080510"/>
+                <a:ext cx="2078355" cy="306705"/>
+              </a:xfrm>
+              <a:prstGeom prst="rect">
+                <a:avLst/>
+              </a:prstGeom>
+              <a:blipFill rotWithShape="1">
+                <a:blip r:embed="rId6"/>
+                <a:stretch>
+                  <a:fillRect l="2994" t="-162733" r="3025" b="-162526"/>
+                </a:stretch>
+              </a:blipFill>
+            </p:spPr>
+            <p:txBody>
+              <a:bodyPr/>
+              <a:lstStyle/>
+              <a:p>
+                <a:r>
+                  <a:rPr lang="en-US" altLang="en-US">
+                    <a:noFill/>
+                  </a:rPr>
+                  <a:t> </a:t>
+                </a:r>
+              </a:p>
+            </p:txBody>
+          </p:sp>
+        </mc:Fallback>
+      </mc:AlternateContent>
+      <mc:AlternateContent xmlns:mc="http://schemas.openxmlformats.org/markup-compatibility/2006">
+        <mc:Choice xmlns:a14="http://schemas.microsoft.com/office/drawing/2010/main" Requires="a14">
+          <p:sp>
+            <p:nvSpPr>
+              <p:cNvPr id="46" name="Text Box 45"/>
+              <p:cNvSpPr txBox="1"/>
+              <p:nvPr/>
+            </p:nvSpPr>
+            <p:spPr>
+              <a:xfrm rot="19560000">
+                <a:off x="7005320" y="4364355"/>
+                <a:ext cx="2078355" cy="306705"/>
+              </a:xfrm>
+              <a:prstGeom prst="rect">
+                <a:avLst/>
+              </a:prstGeom>
+              <a:noFill/>
+            </p:spPr>
+            <p:txBody>
+              <a:bodyPr wrap="square" rtlCol="0">
+                <a:spAutoFit/>
+              </a:bodyPr>
+              <a:p>
+                <a:pPr algn="ctr"/>
+                <a:r>
+                  <a:rPr lang="en-US" altLang="en-US" sz="1400">
+                    <a:latin typeface="DejaVu Math TeX Gyre" panose="02000503000000000000" charset="0"/>
+                    <a:cs typeface="DejaVu Math TeX Gyre" panose="02000503000000000000" charset="0"/>
+                  </a:rPr>
+                  <a:t>T_5</a:t>
+                </a:r>
+                <a14:m>
+                  <m:oMath xmlns:m="http://schemas.openxmlformats.org/officeDocument/2006/math">
+                    <m:r>
+                      <a:rPr lang="en-US" altLang="en-US" sz="1400">
+                        <a:latin typeface="DejaVu Math TeX Gyre" panose="02000503000000000000" charset="0"/>
+                        <a:ea typeface="MS Mincho" charset="0"/>
+                        <a:cs typeface="DejaVu Math TeX Gyre" panose="02000503000000000000" charset="0"/>
+                      </a:rPr>
+                      <m:t>∩¬</m:t>
+                    </m:r>
+                    <m:r>
+                      <m:rPr>
+                        <m:sty m:val="p"/>
+                      </m:rPr>
+                      <a:rPr lang="en-US" altLang="en-US" sz="1400">
+                        <a:latin typeface="DejaVu Math TeX Gyre" panose="02000503000000000000" charset="0"/>
+                        <a:ea typeface="MS Mincho" charset="0"/>
+                        <a:cs typeface="DejaVu Math TeX Gyre" panose="02000503000000000000" charset="0"/>
+                      </a:rPr>
+                      <m:t>B</m:t>
+                    </m:r>
+                    <m:r>
+                      <a:rPr lang="en-US" altLang="en-US" sz="1400">
+                        <a:latin typeface="DejaVu Math TeX Gyre" panose="02000503000000000000" charset="0"/>
+                        <a:ea typeface="MS Mincho" charset="0"/>
+                        <a:cs typeface="DejaVu Math TeX Gyre" panose="02000503000000000000" charset="0"/>
+                      </a:rPr>
+                      <m:t>2</m:t>
+                    </m:r>
+                  </m:oMath>
+                </a14:m>
+                <a:endParaRPr lang="en-US" altLang="en-US" sz="1400">
+                  <a:latin typeface="DejaVu Math TeX Gyre" panose="02000503000000000000" charset="0"/>
+                  <a:cs typeface="DejaVu Math TeX Gyre" panose="02000503000000000000" charset="0"/>
+                </a:endParaRPr>
+              </a:p>
+            </p:txBody>
+          </p:sp>
+        </mc:Choice>
+        <mc:Fallback>
+          <p:sp>
+            <p:nvSpPr>
+              <p:cNvPr id="46" name="Text Box 45"/>
+              <p:cNvSpPr txBox="1">
+                <a:spLocks noRot="1" noChangeAspect="1" noMove="1" noResize="1" noEditPoints="1" noAdjustHandles="1" noChangeArrowheads="1" noChangeShapeType="1" noTextEdit="1"/>
+              </p:cNvSpPr>
+              <p:nvPr/>
+            </p:nvSpPr>
+            <p:spPr>
+              <a:xfrm rot="19560000">
+                <a:off x="7005320" y="4364355"/>
+                <a:ext cx="2078355" cy="306705"/>
+              </a:xfrm>
+              <a:prstGeom prst="rect">
+                <a:avLst/>
+              </a:prstGeom>
+              <a:blipFill rotWithShape="1">
+                <a:blip r:embed="rId7"/>
+                <a:stretch>
+                  <a:fillRect l="4400" t="-180952" r="4430" b="-180745"/>
+                </a:stretch>
+              </a:blipFill>
+            </p:spPr>
+            <p:txBody>
+              <a:bodyPr/>
+              <a:lstStyle/>
+              <a:p>
+                <a:r>
+                  <a:rPr lang="en-US" altLang="en-US">
+                    <a:noFill/>
+                  </a:rPr>
+                  <a:t> </a:t>
+                </a:r>
+              </a:p>
+            </p:txBody>
+          </p:sp>
+        </mc:Fallback>
+      </mc:AlternateContent>
+      <mc:AlternateContent xmlns:mc="http://schemas.openxmlformats.org/markup-compatibility/2006">
+        <mc:Choice xmlns:a14="http://schemas.microsoft.com/office/drawing/2010/main" Requires="a14">
+          <p:sp>
+            <p:nvSpPr>
+              <p:cNvPr id="47" name="Text Box 46"/>
+              <p:cNvSpPr txBox="1"/>
+              <p:nvPr/>
+            </p:nvSpPr>
+            <p:spPr>
+              <a:xfrm rot="1320000">
+                <a:off x="7556500" y="1523365"/>
+                <a:ext cx="2078355" cy="306705"/>
+              </a:xfrm>
+              <a:prstGeom prst="rect">
+                <a:avLst/>
+              </a:prstGeom>
+              <a:noFill/>
+            </p:spPr>
+            <p:txBody>
+              <a:bodyPr wrap="square" rtlCol="0">
+                <a:spAutoFit/>
+              </a:bodyPr>
+              <a:p>
+                <a:pPr algn="ctr"/>
+                <a:r>
+                  <a:rPr lang="" altLang="en-US" sz="1400">
+                    <a:latin typeface="DejaVu Math TeX Gyre" panose="02000503000000000000" charset="0"/>
+                    <a:cs typeface="DejaVu Math TeX Gyre" panose="02000503000000000000" charset="0"/>
+                  </a:rPr>
+                  <a:t>LS_2 </a:t>
+                </a:r>
+                <a14:m>
+                  <m:oMath xmlns:m="http://schemas.openxmlformats.org/officeDocument/2006/math">
+                    <m:r>
+                      <a:rPr lang="en-US" altLang="" sz="1400" i="1">
+                        <a:latin typeface="DejaVu Math TeX Gyre" panose="02000503000000000000" charset="0"/>
+                        <a:cs typeface="DejaVu Math TeX Gyre" panose="02000503000000000000" charset="0"/>
+                      </a:rPr>
+                      <m:t>∩ ¬ </m:t>
+                    </m:r>
+                    <m:r>
+                      <m:rPr>
+                        <m:sty m:val="p"/>
+                      </m:rPr>
+                      <a:rPr lang="en-US" altLang="" sz="1400">
+                        <a:latin typeface="DejaVu Math TeX Gyre" panose="02000503000000000000" charset="0"/>
+                        <a:cs typeface="DejaVu Math TeX Gyre" panose="02000503000000000000" charset="0"/>
+                      </a:rPr>
+                      <m:t>B</m:t>
+                    </m:r>
+                    <m:r>
+                      <a:rPr lang="en-US" altLang="" sz="1400">
+                        <a:latin typeface="DejaVu Math TeX Gyre" panose="02000503000000000000" charset="0"/>
+                        <a:cs typeface="DejaVu Math TeX Gyre" panose="02000503000000000000" charset="0"/>
+                      </a:rPr>
+                      <m:t>2</m:t>
+                    </m:r>
+                  </m:oMath>
+                </a14:m>
+                <a:endParaRPr lang="" altLang="en-US" sz="1400">
                   <a:latin typeface="DejaVu Math TeX Gyre" panose="02000503000000000000" charset="0"/>
                   <a:cs typeface="DejaVu Math TeX Gyre" panose="02000503000000000000" charset="0"/>
                 </a:endParaRPr>
@@ -5252,15 +5468,15 @@
             <p:spPr>
               <a:xfrm rot="1320000">
                 <a:off x="7556500" y="1523365"/>
-                <a:ext cx="2078355" cy="367030"/>
+                <a:ext cx="2078355" cy="306705"/>
               </a:xfrm>
               <a:prstGeom prst="rect">
                 <a:avLst/>
               </a:prstGeom>
               <a:blipFill rotWithShape="1">
-                <a:blip r:embed="rId6"/>
+                <a:blip r:embed="rId8"/>
                 <a:stretch>
-                  <a:fillRect l="306" t="-102422" r="336" b="-102249"/>
+                  <a:fillRect l="855" t="-123395" r="886" b="-123188"/>
                 </a:stretch>
               </a:blipFill>
             </p:spPr>

</xml_diff>

<commit_message>
CHANGED: mixing_tank controller's V3 and M output ports
</commit_message>
<xml_diff>
--- a/controllers/design/mixing_tank/fsa.pptx
+++ b/controllers/design/mixing_tank/fsa.pptx
@@ -4380,7 +4380,7 @@
             </p:nvSpPr>
             <p:spPr>
               <a:xfrm rot="1320000">
-                <a:off x="1358900" y="4761230"/>
+                <a:off x="1347470" y="4767580"/>
                 <a:ext cx="2587625" cy="306705"/>
               </a:xfrm>
               <a:prstGeom prst="rect">
@@ -4403,33 +4403,6 @@
                 </a:r>
                 <a14:m>
                   <m:oMath xmlns:m="http://schemas.openxmlformats.org/officeDocument/2006/math">
-                    <m:r>
-                      <a:rPr lang="en-US" altLang="en-US" sz="1400">
-                        <a:latin typeface="DejaVu Math TeX Gyre" panose="02000503000000000000" charset="0"/>
-                        <a:ea typeface="MS Mincho" charset="0"/>
-                        <a:cs typeface="DejaVu Math TeX Gyre" panose="02000503000000000000" charset="0"/>
-                      </a:rPr>
-                      <m:t>∩¬</m:t>
-                    </m:r>
-                    <m:r>
-                      <m:rPr>
-                        <m:sty m:val="p"/>
-                      </m:rPr>
-                      <a:rPr lang="en-US" altLang="en-US" sz="1400">
-                        <a:latin typeface="DejaVu Math TeX Gyre" panose="02000503000000000000" charset="0"/>
-                        <a:ea typeface="MS Mincho" charset="0"/>
-                        <a:cs typeface="DejaVu Math TeX Gyre" panose="02000503000000000000" charset="0"/>
-                      </a:rPr>
-                      <m:t>B</m:t>
-                    </m:r>
-                    <m:r>
-                      <a:rPr lang="en-US" altLang="en-US" sz="1400">
-                        <a:latin typeface="DejaVu Math TeX Gyre" panose="02000503000000000000" charset="0"/>
-                        <a:ea typeface="MS Mincho" charset="0"/>
-                        <a:cs typeface="DejaVu Math TeX Gyre" panose="02000503000000000000" charset="0"/>
-                      </a:rPr>
-                      <m:t>2</m:t>
-                    </m:r>
                     <m:r>
                       <a:rPr lang="en-US" altLang="en-US" sz="1400">
                         <a:latin typeface="DejaVu Math TeX Gyre" panose="02000503000000000000" charset="0"/>
@@ -4466,7 +4439,7 @@
             </p:nvSpPr>
             <p:spPr>
               <a:xfrm rot="1320000">
-                <a:off x="1358900" y="4761230"/>
+                <a:off x="1347470" y="4767580"/>
                 <a:ext cx="2587625" cy="306705"/>
               </a:xfrm>
               <a:prstGeom prst="rect">
@@ -4527,33 +4500,6 @@
                 </a:r>
                 <a14:m>
                   <m:oMath xmlns:m="http://schemas.openxmlformats.org/officeDocument/2006/math">
-                    <m:r>
-                      <a:rPr lang="en-US" altLang="en-US" sz="1400">
-                        <a:latin typeface="DejaVu Math TeX Gyre" panose="02000503000000000000" charset="0"/>
-                        <a:ea typeface="MS Mincho" charset="0"/>
-                        <a:cs typeface="DejaVu Math TeX Gyre" panose="02000503000000000000" charset="0"/>
-                      </a:rPr>
-                      <m:t>∩¬</m:t>
-                    </m:r>
-                    <m:r>
-                      <m:rPr>
-                        <m:sty m:val="p"/>
-                      </m:rPr>
-                      <a:rPr lang="en-US" altLang="en-US" sz="1400">
-                        <a:latin typeface="DejaVu Math TeX Gyre" panose="02000503000000000000" charset="0"/>
-                        <a:ea typeface="MS Mincho" charset="0"/>
-                        <a:cs typeface="DejaVu Math TeX Gyre" panose="02000503000000000000" charset="0"/>
-                      </a:rPr>
-                      <m:t>B</m:t>
-                    </m:r>
-                    <m:r>
-                      <a:rPr lang="en-US" altLang="en-US" sz="1400">
-                        <a:latin typeface="DejaVu Math TeX Gyre" panose="02000503000000000000" charset="0"/>
-                        <a:ea typeface="MS Mincho" charset="0"/>
-                        <a:cs typeface="DejaVu Math TeX Gyre" panose="02000503000000000000" charset="0"/>
-                      </a:rPr>
-                      <m:t>2</m:t>
-                    </m:r>
                     <m:r>
                       <a:rPr lang="en-US" altLang="en-US" sz="1400">
                         <a:latin typeface="DejaVu Math TeX Gyre" panose="02000503000000000000" charset="0"/>
@@ -5414,7 +5360,7 @@
               <a:p>
                 <a:pPr algn="ctr"/>
                 <a:r>
-                  <a:rPr lang="" altLang="en-US" sz="1400">
+                  <a:rPr lang="en-US" altLang="en-US" sz="1400">
                     <a:latin typeface="DejaVu Math TeX Gyre" panose="02000503000000000000" charset="0"/>
                     <a:cs typeface="DejaVu Math TeX Gyre" panose="02000503000000000000" charset="0"/>
                   </a:rPr>
@@ -5423,7 +5369,7 @@
                 <a14:m>
                   <m:oMath xmlns:m="http://schemas.openxmlformats.org/officeDocument/2006/math">
                     <m:r>
-                      <a:rPr lang="en-US" altLang="" sz="1400" i="1">
+                      <a:rPr lang="en-US" altLang="en-US" sz="1400" i="1">
                         <a:latin typeface="DejaVu Math TeX Gyre" panose="02000503000000000000" charset="0"/>
                         <a:cs typeface="DejaVu Math TeX Gyre" panose="02000503000000000000" charset="0"/>
                       </a:rPr>
@@ -5433,14 +5379,14 @@
                       <m:rPr>
                         <m:sty m:val="p"/>
                       </m:rPr>
-                      <a:rPr lang="en-US" altLang="" sz="1400">
+                      <a:rPr lang="en-US" altLang="en-US" sz="1400">
                         <a:latin typeface="DejaVu Math TeX Gyre" panose="02000503000000000000" charset="0"/>
                         <a:cs typeface="DejaVu Math TeX Gyre" panose="02000503000000000000" charset="0"/>
                       </a:rPr>
                       <m:t>B</m:t>
                     </m:r>
                     <m:r>
-                      <a:rPr lang="en-US" altLang="" sz="1400">
+                      <a:rPr lang="en-US" altLang="en-US" sz="1400">
                         <a:latin typeface="DejaVu Math TeX Gyre" panose="02000503000000000000" charset="0"/>
                         <a:cs typeface="DejaVu Math TeX Gyre" panose="02000503000000000000" charset="0"/>
                       </a:rPr>
@@ -5448,7 +5394,7 @@
                     </m:r>
                   </m:oMath>
                 </a14:m>
-                <a:endParaRPr lang="" altLang="en-US" sz="1400">
+                <a:endParaRPr lang="en-US" altLang="en-US" sz="1400">
                   <a:latin typeface="DejaVu Math TeX Gyre" panose="02000503000000000000" charset="0"/>
                   <a:cs typeface="DejaVu Math TeX Gyre" panose="02000503000000000000" charset="0"/>
                 </a:endParaRPr>

</xml_diff>